<commit_message>
added info on cluster centroids and app vectors
</commit_message>
<xml_diff>
--- a/documentation/posters/PosterSessionMITRE.pptx
+++ b/documentation/posters/PosterSessionMITRE.pptx
@@ -3364,47 +3364,7 @@
                 </a:effectLst>
                 <a:cs typeface="Times New Roman" panose="02020603050405020304" pitchFamily="18" charset="0"/>
               </a:rPr>
-              <a:t>. Robucci, T. Zhu, </a:t>
-            </a:r>
-            <a:r>
-              <a:rPr lang="en-US" sz="8000" dirty="0" smtClean="0">
-                <a:ln w="18415" cmpd="sng">
-                  <a:noFill/>
-                  <a:prstDash val="solid"/>
-                </a:ln>
-                <a:solidFill>
-                  <a:srgbClr val="FFFFFF"/>
-                </a:solidFill>
-                <a:effectLst>
-                  <a:outerShdw blurRad="63500" dir="3600000" algn="tl" rotWithShape="0">
-                    <a:srgbClr val="000000">
-                      <a:alpha val="70000"/>
-                    </a:srgbClr>
-                  </a:outerShdw>
-                </a:effectLst>
-                <a:cs typeface="Times New Roman" panose="02020603050405020304" pitchFamily="18" charset="0"/>
-              </a:rPr>
-              <a:t>T</a:t>
-            </a:r>
-            <a:r>
-              <a:rPr lang="en-US" sz="8000" dirty="0" smtClean="0">
-                <a:ln w="18415" cmpd="sng">
-                  <a:noFill/>
-                  <a:prstDash val="solid"/>
-                </a:ln>
-                <a:solidFill>
-                  <a:srgbClr val="FFFFFF"/>
-                </a:solidFill>
-                <a:effectLst>
-                  <a:outerShdw blurRad="63500" dir="3600000" algn="tl" rotWithShape="0">
-                    <a:srgbClr val="000000">
-                      <a:alpha val="70000"/>
-                    </a:srgbClr>
-                  </a:outerShdw>
-                </a:effectLst>
-                <a:cs typeface="Times New Roman" panose="02020603050405020304" pitchFamily="18" charset="0"/>
-              </a:rPr>
-              <a:t>. Finin</a:t>
+              <a:t>. Robucci, T. Zhu, T. Finin</a:t>
             </a:r>
             <a:endParaRPr lang="en-US" sz="8000" dirty="0">
               <a:ln w="18415" cmpd="sng">
@@ -3525,8 +3485,8 @@
         </p:nvSpPr>
         <p:spPr>
           <a:xfrm>
-            <a:off x="29020335" y="31825793"/>
-            <a:ext cx="14870865" cy="1092607"/>
+            <a:off x="11389532" y="32002856"/>
+            <a:ext cx="21112136" cy="1092607"/>
           </a:xfrm>
           <a:prstGeom prst="rect">
             <a:avLst/>
@@ -3561,7 +3521,31 @@
                 </a:solidFill>
                 <a:cs typeface="Times New Roman" panose="02020603050405020304" pitchFamily="18" charset="0"/>
               </a:rPr>
-              <a:t>upported by NSF #0910838 </a:t>
+              <a:t>upported by </a:t>
+            </a:r>
+            <a:r>
+              <a:rPr lang="en-US" sz="6500" dirty="0" smtClean="0">
+                <a:solidFill>
+                  <a:schemeClr val="tx1">
+                    <a:lumMod val="65000"/>
+                    <a:lumOff val="35000"/>
+                  </a:schemeClr>
+                </a:solidFill>
+                <a:cs typeface="Times New Roman" panose="02020603050405020304" pitchFamily="18" charset="0"/>
+              </a:rPr>
+              <a:t>MITRE and NSF Grants </a:t>
+            </a:r>
+            <a:r>
+              <a:rPr lang="en-US" sz="6500" dirty="0" smtClean="0">
+                <a:solidFill>
+                  <a:schemeClr val="tx1">
+                    <a:lumMod val="65000"/>
+                    <a:lumOff val="35000"/>
+                  </a:schemeClr>
+                </a:solidFill>
+                <a:cs typeface="Times New Roman" panose="02020603050405020304" pitchFamily="18" charset="0"/>
+              </a:rPr>
+              <a:t>#0910838 </a:t>
             </a:r>
             <a:r>
               <a:rPr lang="en-US" sz="6500" dirty="0">
@@ -3621,7 +3605,7 @@
         </p:blipFill>
         <p:spPr>
           <a:xfrm>
-            <a:off x="21112136" y="31270142"/>
+            <a:off x="42151120" y="31209809"/>
             <a:ext cx="1666928" cy="1666928"/>
           </a:xfrm>
           <a:prstGeom prst="rect">
@@ -4211,7 +4195,7 @@
         </p:blipFill>
         <p:spPr>
           <a:xfrm>
-            <a:off x="6978632" y="14332050"/>
+            <a:off x="7010650" y="14308201"/>
             <a:ext cx="2639060" cy="2996348"/>
           </a:xfrm>
           <a:prstGeom prst="rect">
@@ -4855,7 +4839,24 @@
                 </a:effectLst>
                 <a:cs typeface="Times New Roman" panose="02020603050405020304" pitchFamily="18" charset="0"/>
               </a:rPr>
-              <a:t>Procedural details</a:t>
+              <a:t>Procedural </a:t>
+            </a:r>
+            <a:r>
+              <a:rPr lang="en-US" sz="8000" dirty="0" smtClean="0">
+                <a:ln w="18415" cmpd="sng">
+                  <a:noFill/>
+                  <a:prstDash val="solid"/>
+                </a:ln>
+                <a:effectLst>
+                  <a:outerShdw blurRad="63500" dir="3600000" algn="tl" rotWithShape="0">
+                    <a:srgbClr val="000000">
+                      <a:alpha val="70000"/>
+                    </a:srgbClr>
+                  </a:outerShdw>
+                </a:effectLst>
+                <a:cs typeface="Times New Roman" panose="02020603050405020304" pitchFamily="18" charset="0"/>
+              </a:rPr>
+              <a:t>Details</a:t>
             </a:r>
             <a:endParaRPr lang="en-US" sz="8000" dirty="0">
               <a:ln w="18415" cmpd="sng">
@@ -5151,8 +5152,8 @@
         </p:blipFill>
         <p:spPr>
           <a:xfrm>
-            <a:off x="21833999" y="7609680"/>
-            <a:ext cx="5536703" cy="7507239"/>
+            <a:off x="21319501" y="6405522"/>
+            <a:ext cx="6928523" cy="8797401"/>
           </a:xfrm>
           <a:prstGeom prst="rect">
             <a:avLst/>
@@ -5181,8 +5182,8 @@
         </p:blipFill>
         <p:spPr>
           <a:xfrm>
-            <a:off x="38490396" y="7623514"/>
-            <a:ext cx="5536703" cy="7507239"/>
+            <a:off x="37310305" y="6402649"/>
+            <a:ext cx="7049606" cy="8782790"/>
           </a:xfrm>
           <a:prstGeom prst="rect">
             <a:avLst/>
@@ -5211,8 +5212,8 @@
         </p:blipFill>
         <p:spPr>
           <a:xfrm>
-            <a:off x="33133607" y="7620641"/>
-            <a:ext cx="5536703" cy="7507239"/>
+            <a:off x="31886103" y="6405522"/>
+            <a:ext cx="7049606" cy="8779917"/>
           </a:xfrm>
           <a:prstGeom prst="rect">
             <a:avLst/>
@@ -5241,8 +5242,8 @@
         </p:blipFill>
         <p:spPr>
           <a:xfrm>
-            <a:off x="27214683" y="7620641"/>
-            <a:ext cx="5536703" cy="7507239"/>
+            <a:off x="26544183" y="6405522"/>
+            <a:ext cx="7049606" cy="8779917"/>
           </a:xfrm>
           <a:prstGeom prst="rect">
             <a:avLst/>
@@ -5257,7 +5258,7 @@
         </p:nvSpPr>
         <p:spPr>
           <a:xfrm>
-            <a:off x="22631482" y="15366059"/>
+            <a:off x="22812894" y="15385709"/>
             <a:ext cx="3941736" cy="646331"/>
           </a:xfrm>
           <a:prstGeom prst="rect">
@@ -5288,8 +5289,8 @@
         </p:nvSpPr>
         <p:spPr>
           <a:xfrm>
-            <a:off x="28012166" y="15366059"/>
-            <a:ext cx="3941736" cy="1200329"/>
+            <a:off x="27880678" y="15356171"/>
+            <a:ext cx="4376616" cy="1200329"/>
           </a:xfrm>
           <a:prstGeom prst="rect">
             <a:avLst/>
@@ -5319,8 +5320,8 @@
         </p:nvSpPr>
         <p:spPr>
           <a:xfrm>
-            <a:off x="34206700" y="15304294"/>
-            <a:ext cx="3941736" cy="1200329"/>
+            <a:off x="33366864" y="15387643"/>
+            <a:ext cx="4088083" cy="1200329"/>
           </a:xfrm>
           <a:prstGeom prst="rect">
             <a:avLst/>
@@ -5350,7 +5351,7 @@
         </p:nvSpPr>
         <p:spPr>
           <a:xfrm>
-            <a:off x="39287879" y="15387377"/>
+            <a:off x="38864240" y="15356171"/>
             <a:ext cx="3941736" cy="1754326"/>
           </a:xfrm>
           <a:prstGeom prst="rect">

</xml_diff>